<commit_message>
content tom draft 1
</commit_message>
<xml_diff>
--- a/_SLIDES/DEEL1/H6/5_methoden.pptx
+++ b/_SLIDES/DEEL1/H6/5_methoden.pptx
@@ -2715,7 +2715,7 @@
           <a:p>
             <a:fld id="{AAB1E9D1-C262-4CF5-AED2-7DBFF7C74527}" type="datetimeFigureOut">
               <a:rPr lang="nl-BE" smtClean="0"/>
-              <a:t>25/11/2018</a:t>
+              <a:t>24/11/2019</a:t>
             </a:fld>
             <a:endParaRPr lang="nl-BE"/>
           </a:p>
@@ -3132,7 +3132,7 @@
           <a:p>
             <a:fld id="{2661A00B-007A-4326-8859-8C83DD4C6E5D}" type="datetimeFigureOut">
               <a:rPr lang="nl-BE" smtClean="0"/>
-              <a:t>25/11/2018</a:t>
+              <a:t>24/11/2019</a:t>
             </a:fld>
             <a:endParaRPr lang="nl-BE"/>
           </a:p>
@@ -3332,7 +3332,7 @@
           <a:p>
             <a:fld id="{2661A00B-007A-4326-8859-8C83DD4C6E5D}" type="datetimeFigureOut">
               <a:rPr lang="nl-BE" smtClean="0"/>
-              <a:t>25/11/2018</a:t>
+              <a:t>24/11/2019</a:t>
             </a:fld>
             <a:endParaRPr lang="nl-BE"/>
           </a:p>
@@ -3542,7 +3542,7 @@
           <a:p>
             <a:fld id="{2661A00B-007A-4326-8859-8C83DD4C6E5D}" type="datetimeFigureOut">
               <a:rPr lang="nl-BE" smtClean="0"/>
-              <a:t>25/11/2018</a:t>
+              <a:t>24/11/2019</a:t>
             </a:fld>
             <a:endParaRPr lang="nl-BE"/>
           </a:p>
@@ -3742,7 +3742,7 @@
           <a:p>
             <a:fld id="{2661A00B-007A-4326-8859-8C83DD4C6E5D}" type="datetimeFigureOut">
               <a:rPr lang="nl-BE" smtClean="0"/>
-              <a:t>25/11/2018</a:t>
+              <a:t>24/11/2019</a:t>
             </a:fld>
             <a:endParaRPr lang="nl-BE"/>
           </a:p>
@@ -4018,7 +4018,7 @@
           <a:p>
             <a:fld id="{2661A00B-007A-4326-8859-8C83DD4C6E5D}" type="datetimeFigureOut">
               <a:rPr lang="nl-BE" smtClean="0"/>
-              <a:t>25/11/2018</a:t>
+              <a:t>24/11/2019</a:t>
             </a:fld>
             <a:endParaRPr lang="nl-BE"/>
           </a:p>
@@ -4286,7 +4286,7 @@
           <a:p>
             <a:fld id="{2661A00B-007A-4326-8859-8C83DD4C6E5D}" type="datetimeFigureOut">
               <a:rPr lang="nl-BE" smtClean="0"/>
-              <a:t>25/11/2018</a:t>
+              <a:t>24/11/2019</a:t>
             </a:fld>
             <a:endParaRPr lang="nl-BE"/>
           </a:p>
@@ -4701,7 +4701,7 @@
           <a:p>
             <a:fld id="{2661A00B-007A-4326-8859-8C83DD4C6E5D}" type="datetimeFigureOut">
               <a:rPr lang="nl-BE" smtClean="0"/>
-              <a:t>25/11/2018</a:t>
+              <a:t>24/11/2019</a:t>
             </a:fld>
             <a:endParaRPr lang="nl-BE"/>
           </a:p>
@@ -4843,7 +4843,7 @@
           <a:p>
             <a:fld id="{2661A00B-007A-4326-8859-8C83DD4C6E5D}" type="datetimeFigureOut">
               <a:rPr lang="nl-BE" smtClean="0"/>
-              <a:t>25/11/2018</a:t>
+              <a:t>24/11/2019</a:t>
             </a:fld>
             <a:endParaRPr lang="nl-BE"/>
           </a:p>
@@ -4956,7 +4956,7 @@
           <a:p>
             <a:fld id="{2661A00B-007A-4326-8859-8C83DD4C6E5D}" type="datetimeFigureOut">
               <a:rPr lang="nl-BE" smtClean="0"/>
-              <a:t>25/11/2018</a:t>
+              <a:t>24/11/2019</a:t>
             </a:fld>
             <a:endParaRPr lang="nl-BE"/>
           </a:p>
@@ -5269,7 +5269,7 @@
           <a:p>
             <a:fld id="{2661A00B-007A-4326-8859-8C83DD4C6E5D}" type="datetimeFigureOut">
               <a:rPr lang="nl-BE" smtClean="0"/>
-              <a:t>25/11/2018</a:t>
+              <a:t>24/11/2019</a:t>
             </a:fld>
             <a:endParaRPr lang="nl-BE"/>
           </a:p>
@@ -5558,7 +5558,7 @@
           <a:p>
             <a:fld id="{2661A00B-007A-4326-8859-8C83DD4C6E5D}" type="datetimeFigureOut">
               <a:rPr lang="nl-BE" smtClean="0"/>
-              <a:t>25/11/2018</a:t>
+              <a:t>24/11/2019</a:t>
             </a:fld>
             <a:endParaRPr lang="nl-BE"/>
           </a:p>
@@ -5801,7 +5801,7 @@
           <a:p>
             <a:fld id="{2661A00B-007A-4326-8859-8C83DD4C6E5D}" type="datetimeFigureOut">
               <a:rPr lang="nl-BE" smtClean="0"/>
-              <a:t>25/11/2018</a:t>
+              <a:t>24/11/2019</a:t>
             </a:fld>
             <a:endParaRPr lang="nl-BE"/>
           </a:p>
@@ -6602,15 +6602,22 @@
                   <a:srgbClr val="FFFF00"/>
                 </a:highlight>
               </a:rPr>
-              <a:t> </a:t>
-            </a:r>
-            <a:r>
-              <a:rPr lang="en-IE" sz="1800" dirty="0" err="1">
-                <a:highlight>
-                  <a:srgbClr val="FFFF00"/>
-                </a:highlight>
-              </a:rPr>
-              <a:t>zin</a:t>
+              <a:t> zin”</a:t>
+            </a:r>
+            <a:r>
+              <a:rPr lang="en-IE" sz="1800" dirty="0"/>
+              <a:t>);</a:t>
+            </a:r>
+          </a:p>
+          <a:p>
+            <a:pPr lvl="1"/>
+            <a:r>
+              <a:rPr lang="en-IE" sz="1800" dirty="0" err="1"/>
+              <a:t>Math.Pow</a:t>
+            </a:r>
+            <a:r>
+              <a:rPr lang="en-IE" sz="1800" dirty="0"/>
+              <a:t>(</a:t>
             </a:r>
             <a:r>
               <a:rPr lang="en-IE" sz="1800" dirty="0">
@@ -6618,34 +6625,11 @@
                   <a:srgbClr val="FFFF00"/>
                 </a:highlight>
               </a:rPr>
-              <a:t>”</a:t>
+              <a:t>4,3</a:t>
             </a:r>
             <a:r>
               <a:rPr lang="en-IE" sz="1800" dirty="0"/>
-              <a:t>)</a:t>
-            </a:r>
-          </a:p>
-          <a:p>
-            <a:pPr lvl="1"/>
-            <a:r>
-              <a:rPr lang="en-IE" sz="1800" dirty="0" err="1"/>
-              <a:t>Paper.Children.Add</a:t>
-            </a:r>
-            <a:r>
-              <a:rPr lang="en-IE" sz="1800" dirty="0"/>
-              <a:t>(</a:t>
-            </a:r>
-            <a:r>
-              <a:rPr lang="en-IE" sz="1800" dirty="0" err="1">
-                <a:highlight>
-                  <a:srgbClr val="FFFF00"/>
-                </a:highlight>
-              </a:rPr>
-              <a:t>myEllipse</a:t>
-            </a:r>
-            <a:r>
-              <a:rPr lang="en-IE" sz="1800" dirty="0"/>
-              <a:t>)</a:t>
+              <a:t>);</a:t>
             </a:r>
           </a:p>
           <a:p>
@@ -14910,7 +14894,7 @@
         </p:blipFill>
         <p:spPr bwMode="auto">
           <a:xfrm>
-            <a:off x="2414492" y="4077072"/>
+            <a:off x="2397714" y="4077072"/>
             <a:ext cx="9932304" cy="1320280"/>
           </a:xfrm>
           <a:prstGeom prst="rect">
@@ -21707,10 +21691,23 @@
                   <a:srgbClr val="000000"/>
                 </a:solidFill>
               </a:rPr>
-              <a:t> (minder </a:t>
-            </a:r>
-            <a:r>
-              <a:rPr lang="en-IE" sz="2400" dirty="0" err="1">
+              <a:t> </a:t>
+            </a:r>
+          </a:p>
+          <a:p>
+            <a:pPr marL="914400" lvl="1" indent="-457200">
+              <a:defRPr/>
+            </a:pPr>
+            <a:r>
+              <a:rPr lang="en-IE" sz="2000" dirty="0">
+                <a:solidFill>
+                  <a:srgbClr val="000000"/>
+                </a:solidFill>
+              </a:rPr>
+              <a:t>(minder </a:t>
+            </a:r>
+            <a:r>
+              <a:rPr lang="en-IE" sz="2000" dirty="0" err="1">
                 <a:solidFill>
                   <a:srgbClr val="000000"/>
                 </a:solidFill>
@@ -21718,7 +21715,7 @@
               <a:t>typwerk</a:t>
             </a:r>
             <a:r>
-              <a:rPr lang="en-IE" sz="2400" dirty="0">
+              <a:rPr lang="en-IE" sz="2000" dirty="0">
                 <a:solidFill>
                   <a:srgbClr val="000000"/>
                 </a:solidFill>
@@ -21726,7 +21723,7 @@
               <a:t>, minder </a:t>
             </a:r>
             <a:r>
-              <a:rPr lang="en-IE" sz="2400" dirty="0" err="1">
+              <a:rPr lang="en-IE" sz="2000" dirty="0" err="1">
                 <a:solidFill>
                   <a:srgbClr val="000000"/>
                 </a:solidFill>
@@ -21734,7 +21731,7 @@
               <a:t>kans</a:t>
             </a:r>
             <a:r>
-              <a:rPr lang="en-IE" sz="2400" dirty="0">
+              <a:rPr lang="en-IE" sz="2000" dirty="0">
                 <a:solidFill>
                   <a:srgbClr val="000000"/>
                 </a:solidFill>
@@ -21742,7 +21739,7 @@
               <a:t> op </a:t>
             </a:r>
             <a:r>
-              <a:rPr lang="en-IE" sz="2400" dirty="0" err="1">
+              <a:rPr lang="en-IE" sz="2000" dirty="0" err="1">
                 <a:solidFill>
                   <a:srgbClr val="000000"/>
                 </a:solidFill>
@@ -21750,7 +21747,7 @@
               <a:t>fouten</a:t>
             </a:r>
             <a:r>
-              <a:rPr lang="en-IE" sz="2400" dirty="0">
+              <a:rPr lang="en-IE" sz="2000" dirty="0">
                 <a:solidFill>
                   <a:srgbClr val="000000"/>
                 </a:solidFill>
@@ -21840,6 +21837,55 @@
                                           <p:spTgt spid="3">
                                             <p:txEl>
                                               <p:pRg st="3" end="3"/>
+                                            </p:txEl>
+                                          </p:spTgt>
+                                        </p:tgtEl>
+                                        <p:attrNameLst>
+                                          <p:attrName>style.visibility</p:attrName>
+                                        </p:attrNameLst>
+                                      </p:cBhvr>
+                                      <p:to>
+                                        <p:strVal val="visible"/>
+                                      </p:to>
+                                    </p:set>
+                                  </p:childTnLst>
+                                </p:cTn>
+                              </p:par>
+                            </p:childTnLst>
+                          </p:cTn>
+                        </p:par>
+                      </p:childTnLst>
+                    </p:cTn>
+                  </p:par>
+                  <p:par>
+                    <p:cTn id="7" fill="hold">
+                      <p:stCondLst>
+                        <p:cond delay="indefinite"/>
+                      </p:stCondLst>
+                      <p:childTnLst>
+                        <p:par>
+                          <p:cTn id="8" fill="hold">
+                            <p:stCondLst>
+                              <p:cond delay="0"/>
+                            </p:stCondLst>
+                            <p:childTnLst>
+                              <p:par>
+                                <p:cTn id="9" presetID="1" presetClass="entr" presetSubtype="0" fill="hold" nodeType="clickEffect">
+                                  <p:stCondLst>
+                                    <p:cond delay="0"/>
+                                  </p:stCondLst>
+                                  <p:childTnLst>
+                                    <p:set>
+                                      <p:cBhvr>
+                                        <p:cTn id="10" dur="1" fill="hold">
+                                          <p:stCondLst>
+                                            <p:cond delay="0"/>
+                                          </p:stCondLst>
+                                        </p:cTn>
+                                        <p:tgtEl>
+                                          <p:spTgt spid="3">
+                                            <p:txEl>
+                                              <p:pRg st="4" end="4"/>
                                             </p:txEl>
                                           </p:spTgt>
                                         </p:tgtEl>
@@ -23441,7 +23487,7 @@
               <a:rPr lang="nl-BE" sz="1400" dirty="0">
                 <a:hlinkClick r:id="rId2"/>
               </a:rPr>
-              <a:t>https://timdams.gitbook.io/project/appendix/all-in-projecten/2_asciimovieswithmethods</a:t>
+              <a:t>https://apwt.gitbook.io/ziescherp/semester-1-appendix/all-in-projecten/2_asciimovieswithmethods</a:t>
             </a:r>
             <a:r>
               <a:rPr lang="nl-BE" sz="1400" dirty="0"/>

</xml_diff>